<commit_message>
Last changes before presentation
</commit_message>
<xml_diff>
--- a/Presentation/Presentation_Capteurs_Nimesh_TAHALOOA_Ahmed_TSOROEV.pptx
+++ b/Presentation/Presentation_Capteurs_Nimesh_TAHALOOA_Ahmed_TSOROEV.pptx
@@ -214,7 +214,7 @@
           <a:p>
             <a:fld id="{1219A645-C971-4747-A2EF-93C586456C04}" type="datetimeFigureOut">
               <a:rPr lang="fr-FR" smtClean="0"/>
-              <a:t>25/03/2020</a:t>
+              <a:t>26/03/2020</a:t>
             </a:fld>
             <a:endParaRPr lang="fr-FR"/>
           </a:p>
@@ -629,7 +629,7 @@
           <a:p>
             <a:fld id="{7B99F690-3B51-4FDB-B1F1-5FF808B666D3}" type="datetime1">
               <a:rPr lang="fr-FR" smtClean="0"/>
-              <a:t>25/03/2020</a:t>
+              <a:t>26/03/2020</a:t>
             </a:fld>
             <a:endParaRPr lang="fr-FR"/>
           </a:p>
@@ -827,7 +827,7 @@
           <a:p>
             <a:fld id="{54AD6DD8-55CB-49B2-8FAD-315734BFA61F}" type="datetime1">
               <a:rPr lang="fr-FR" smtClean="0"/>
-              <a:t>25/03/2020</a:t>
+              <a:t>26/03/2020</a:t>
             </a:fld>
             <a:endParaRPr lang="fr-FR"/>
           </a:p>
@@ -1035,7 +1035,7 @@
           <a:p>
             <a:fld id="{99557A5C-696A-4594-AB5D-527830BBAFEF}" type="datetime1">
               <a:rPr lang="fr-FR" smtClean="0"/>
-              <a:t>25/03/2020</a:t>
+              <a:t>26/03/2020</a:t>
             </a:fld>
             <a:endParaRPr lang="fr-FR"/>
           </a:p>
@@ -1233,7 +1233,7 @@
           <a:p>
             <a:fld id="{558AE91D-F9B0-4506-A6EB-8E84BD0F9DD6}" type="datetime1">
               <a:rPr lang="fr-FR" smtClean="0"/>
-              <a:t>25/03/2020</a:t>
+              <a:t>26/03/2020</a:t>
             </a:fld>
             <a:endParaRPr lang="fr-FR"/>
           </a:p>
@@ -1508,7 +1508,7 @@
           <a:p>
             <a:fld id="{7D238502-27E8-49E6-9948-E745D3D4FFE6}" type="datetime1">
               <a:rPr lang="fr-FR" smtClean="0"/>
-              <a:t>25/03/2020</a:t>
+              <a:t>26/03/2020</a:t>
             </a:fld>
             <a:endParaRPr lang="fr-FR"/>
           </a:p>
@@ -1773,7 +1773,7 @@
           <a:p>
             <a:fld id="{AA71EA2D-76F1-4790-B593-CBA766D6066D}" type="datetime1">
               <a:rPr lang="fr-FR" smtClean="0"/>
-              <a:t>25/03/2020</a:t>
+              <a:t>26/03/2020</a:t>
             </a:fld>
             <a:endParaRPr lang="fr-FR"/>
           </a:p>
@@ -2185,7 +2185,7 @@
           <a:p>
             <a:fld id="{2390D14E-3C58-43B3-A172-1352AD4F2F0B}" type="datetime1">
               <a:rPr lang="fr-FR" smtClean="0"/>
-              <a:t>25/03/2020</a:t>
+              <a:t>26/03/2020</a:t>
             </a:fld>
             <a:endParaRPr lang="fr-FR"/>
           </a:p>
@@ -2326,7 +2326,7 @@
           <a:p>
             <a:fld id="{E2AACFA8-C447-459E-9EDB-234E1845BBB0}" type="datetime1">
               <a:rPr lang="fr-FR" smtClean="0"/>
-              <a:t>25/03/2020</a:t>
+              <a:t>26/03/2020</a:t>
             </a:fld>
             <a:endParaRPr lang="fr-FR"/>
           </a:p>
@@ -2439,7 +2439,7 @@
           <a:p>
             <a:fld id="{D9107974-8D3A-433F-949D-84646BA891C6}" type="datetime1">
               <a:rPr lang="fr-FR" smtClean="0"/>
-              <a:t>25/03/2020</a:t>
+              <a:t>26/03/2020</a:t>
             </a:fld>
             <a:endParaRPr lang="fr-FR"/>
           </a:p>
@@ -2750,7 +2750,7 @@
           <a:p>
             <a:fld id="{40AE79BF-AC43-4491-ABC6-D4F785D2523D}" type="datetime1">
               <a:rPr lang="fr-FR" smtClean="0"/>
-              <a:t>25/03/2020</a:t>
+              <a:t>26/03/2020</a:t>
             </a:fld>
             <a:endParaRPr lang="fr-FR"/>
           </a:p>
@@ -3038,7 +3038,7 @@
           <a:p>
             <a:fld id="{7F89F401-4F47-48FB-9AE3-EA7E5DAEAA1A}" type="datetime1">
               <a:rPr lang="fr-FR" smtClean="0"/>
-              <a:t>25/03/2020</a:t>
+              <a:t>26/03/2020</a:t>
             </a:fld>
             <a:endParaRPr lang="fr-FR"/>
           </a:p>
@@ -3279,7 +3279,7 @@
           <a:p>
             <a:fld id="{9BB9C24C-7F1B-4D18-BE4E-9F6D0D8F4D96}" type="datetime1">
               <a:rPr lang="fr-FR" smtClean="0"/>
-              <a:t>25/03/2020</a:t>
+              <a:t>26/03/2020</a:t>
             </a:fld>
             <a:endParaRPr lang="fr-FR"/>
           </a:p>
@@ -3796,10 +3796,18 @@
           <a:lstStyle/>
           <a:p>
             <a:fld id="{43B0AB4A-0575-400B-9EA0-B9BBCBE45FA9}" type="slidenum">
-              <a:rPr lang="fr-FR" smtClean="0"/>
+              <a:rPr lang="fr-FR" b="1" smtClean="0">
+                <a:solidFill>
+                  <a:schemeClr val="tx1"/>
+                </a:solidFill>
+              </a:rPr>
               <a:t>1</a:t>
             </a:fld>
-            <a:endParaRPr lang="fr-FR"/>
+            <a:endParaRPr lang="fr-FR" b="1" dirty="0">
+              <a:solidFill>
+                <a:schemeClr val="tx1"/>
+              </a:solidFill>
+            </a:endParaRPr>
           </a:p>
         </p:txBody>
       </p:sp>
@@ -4166,10 +4174,18 @@
           <a:lstStyle/>
           <a:p>
             <a:fld id="{43B0AB4A-0575-400B-9EA0-B9BBCBE45FA9}" type="slidenum">
-              <a:rPr lang="fr-FR" smtClean="0"/>
+              <a:rPr lang="fr-FR" b="1" smtClean="0">
+                <a:solidFill>
+                  <a:schemeClr val="tx1"/>
+                </a:solidFill>
+              </a:rPr>
               <a:t>10</a:t>
             </a:fld>
-            <a:endParaRPr lang="fr-FR"/>
+            <a:endParaRPr lang="fr-FR" b="1" dirty="0">
+              <a:solidFill>
+                <a:schemeClr val="tx1"/>
+              </a:solidFill>
+            </a:endParaRPr>
           </a:p>
         </p:txBody>
       </p:sp>
@@ -5008,10 +5024,18 @@
           <a:lstStyle/>
           <a:p>
             <a:fld id="{43B0AB4A-0575-400B-9EA0-B9BBCBE45FA9}" type="slidenum">
-              <a:rPr lang="fr-FR" smtClean="0"/>
+              <a:rPr lang="fr-FR" b="1" smtClean="0">
+                <a:solidFill>
+                  <a:schemeClr val="tx1"/>
+                </a:solidFill>
+              </a:rPr>
               <a:t>12</a:t>
             </a:fld>
-            <a:endParaRPr lang="fr-FR"/>
+            <a:endParaRPr lang="fr-FR" b="1" dirty="0">
+              <a:solidFill>
+                <a:schemeClr val="tx1"/>
+              </a:solidFill>
+            </a:endParaRPr>
           </a:p>
         </p:txBody>
       </p:sp>
@@ -5634,10 +5658,18 @@
           <a:lstStyle/>
           <a:p>
             <a:fld id="{43B0AB4A-0575-400B-9EA0-B9BBCBE45FA9}" type="slidenum">
-              <a:rPr lang="fr-FR" smtClean="0"/>
+              <a:rPr lang="fr-FR" b="1" smtClean="0">
+                <a:solidFill>
+                  <a:schemeClr val="tx1"/>
+                </a:solidFill>
+              </a:rPr>
               <a:t>13</a:t>
             </a:fld>
-            <a:endParaRPr lang="fr-FR"/>
+            <a:endParaRPr lang="fr-FR" b="1" dirty="0">
+              <a:solidFill>
+                <a:schemeClr val="tx1"/>
+              </a:solidFill>
+            </a:endParaRPr>
           </a:p>
         </p:txBody>
       </p:sp>
@@ -6385,10 +6417,18 @@
           <a:lstStyle/>
           <a:p>
             <a:fld id="{43B0AB4A-0575-400B-9EA0-B9BBCBE45FA9}" type="slidenum">
-              <a:rPr lang="fr-FR" smtClean="0"/>
+              <a:rPr lang="fr-FR" b="1" smtClean="0">
+                <a:solidFill>
+                  <a:schemeClr val="tx1"/>
+                </a:solidFill>
+              </a:rPr>
               <a:t>14</a:t>
             </a:fld>
-            <a:endParaRPr lang="fr-FR"/>
+            <a:endParaRPr lang="fr-FR" b="1" dirty="0">
+              <a:solidFill>
+                <a:schemeClr val="tx1"/>
+              </a:solidFill>
+            </a:endParaRPr>
           </a:p>
         </p:txBody>
       </p:sp>
@@ -6978,10 +7018,18 @@
           <a:lstStyle/>
           <a:p>
             <a:fld id="{43B0AB4A-0575-400B-9EA0-B9BBCBE45FA9}" type="slidenum">
-              <a:rPr lang="fr-FR" smtClean="0"/>
+              <a:rPr lang="fr-FR" b="1" smtClean="0">
+                <a:solidFill>
+                  <a:schemeClr val="tx1"/>
+                </a:solidFill>
+              </a:rPr>
               <a:t>15</a:t>
             </a:fld>
-            <a:endParaRPr lang="fr-FR"/>
+            <a:endParaRPr lang="fr-FR" b="1" dirty="0">
+              <a:solidFill>
+                <a:schemeClr val="tx1"/>
+              </a:solidFill>
+            </a:endParaRPr>
           </a:p>
         </p:txBody>
       </p:sp>
@@ -7451,10 +7499,18 @@
           <a:lstStyle/>
           <a:p>
             <a:fld id="{43B0AB4A-0575-400B-9EA0-B9BBCBE45FA9}" type="slidenum">
-              <a:rPr lang="fr-FR" smtClean="0"/>
+              <a:rPr lang="fr-FR" b="1" smtClean="0">
+                <a:solidFill>
+                  <a:schemeClr val="tx1"/>
+                </a:solidFill>
+              </a:rPr>
               <a:t>16</a:t>
             </a:fld>
-            <a:endParaRPr lang="fr-FR"/>
+            <a:endParaRPr lang="fr-FR" b="1" dirty="0">
+              <a:solidFill>
+                <a:schemeClr val="tx1"/>
+              </a:solidFill>
+            </a:endParaRPr>
           </a:p>
         </p:txBody>
       </p:sp>
@@ -7909,10 +7965,18 @@
           <a:lstStyle/>
           <a:p>
             <a:fld id="{43B0AB4A-0575-400B-9EA0-B9BBCBE45FA9}" type="slidenum">
-              <a:rPr lang="fr-FR" smtClean="0"/>
+              <a:rPr lang="fr-FR" b="1" smtClean="0">
+                <a:solidFill>
+                  <a:schemeClr val="tx1"/>
+                </a:solidFill>
+              </a:rPr>
               <a:t>17</a:t>
             </a:fld>
-            <a:endParaRPr lang="fr-FR"/>
+            <a:endParaRPr lang="fr-FR" b="1" dirty="0">
+              <a:solidFill>
+                <a:schemeClr val="tx1"/>
+              </a:solidFill>
+            </a:endParaRPr>
           </a:p>
         </p:txBody>
       </p:sp>
@@ -8279,10 +8343,18 @@
           <a:lstStyle/>
           <a:p>
             <a:fld id="{43B0AB4A-0575-400B-9EA0-B9BBCBE45FA9}" type="slidenum">
-              <a:rPr lang="fr-FR" smtClean="0"/>
+              <a:rPr lang="fr-FR" b="1" smtClean="0">
+                <a:solidFill>
+                  <a:schemeClr val="tx1"/>
+                </a:solidFill>
+              </a:rPr>
               <a:t>18</a:t>
             </a:fld>
-            <a:endParaRPr lang="fr-FR"/>
+            <a:endParaRPr lang="fr-FR" b="1" dirty="0">
+              <a:solidFill>
+                <a:schemeClr val="tx1"/>
+              </a:solidFill>
+            </a:endParaRPr>
           </a:p>
         </p:txBody>
       </p:sp>
@@ -8992,10 +9064,18 @@
           <a:lstStyle/>
           <a:p>
             <a:fld id="{43B0AB4A-0575-400B-9EA0-B9BBCBE45FA9}" type="slidenum">
-              <a:rPr lang="fr-FR" smtClean="0"/>
+              <a:rPr lang="fr-FR" b="1" smtClean="0">
+                <a:solidFill>
+                  <a:schemeClr val="tx1"/>
+                </a:solidFill>
+              </a:rPr>
               <a:t>2</a:t>
             </a:fld>
-            <a:endParaRPr lang="fr-FR"/>
+            <a:endParaRPr lang="fr-FR" b="1" dirty="0">
+              <a:solidFill>
+                <a:schemeClr val="tx1"/>
+              </a:solidFill>
+            </a:endParaRPr>
           </a:p>
         </p:txBody>
       </p:sp>
@@ -9603,10 +9683,18 @@
           <a:lstStyle/>
           <a:p>
             <a:fld id="{43B0AB4A-0575-400B-9EA0-B9BBCBE45FA9}" type="slidenum">
-              <a:rPr lang="fr-FR" smtClean="0"/>
+              <a:rPr lang="fr-FR" b="1" smtClean="0">
+                <a:solidFill>
+                  <a:schemeClr val="tx1"/>
+                </a:solidFill>
+              </a:rPr>
               <a:t>3</a:t>
             </a:fld>
-            <a:endParaRPr lang="fr-FR"/>
+            <a:endParaRPr lang="fr-FR" b="1" dirty="0">
+              <a:solidFill>
+                <a:schemeClr val="tx1"/>
+              </a:solidFill>
+            </a:endParaRPr>
           </a:p>
         </p:txBody>
       </p:sp>
@@ -10091,10 +10179,18 @@
           <a:lstStyle/>
           <a:p>
             <a:fld id="{43B0AB4A-0575-400B-9EA0-B9BBCBE45FA9}" type="slidenum">
-              <a:rPr lang="fr-FR" smtClean="0"/>
+              <a:rPr lang="fr-FR" b="1" smtClean="0">
+                <a:solidFill>
+                  <a:schemeClr val="tx1"/>
+                </a:solidFill>
+              </a:rPr>
               <a:t>4</a:t>
             </a:fld>
-            <a:endParaRPr lang="fr-FR"/>
+            <a:endParaRPr lang="fr-FR" b="1" dirty="0">
+              <a:solidFill>
+                <a:schemeClr val="tx1"/>
+              </a:solidFill>
+            </a:endParaRPr>
           </a:p>
         </p:txBody>
       </p:sp>
@@ -10541,10 +10637,18 @@
           <a:lstStyle/>
           <a:p>
             <a:fld id="{43B0AB4A-0575-400B-9EA0-B9BBCBE45FA9}" type="slidenum">
-              <a:rPr lang="fr-FR" smtClean="0"/>
+              <a:rPr lang="fr-FR" b="1" smtClean="0">
+                <a:solidFill>
+                  <a:schemeClr val="tx1"/>
+                </a:solidFill>
+              </a:rPr>
               <a:t>5</a:t>
             </a:fld>
-            <a:endParaRPr lang="fr-FR"/>
+            <a:endParaRPr lang="fr-FR" b="1" dirty="0">
+              <a:solidFill>
+                <a:schemeClr val="tx1"/>
+              </a:solidFill>
+            </a:endParaRPr>
           </a:p>
         </p:txBody>
       </p:sp>
@@ -11031,10 +11135,18 @@
           <a:lstStyle/>
           <a:p>
             <a:fld id="{43B0AB4A-0575-400B-9EA0-B9BBCBE45FA9}" type="slidenum">
-              <a:rPr lang="fr-FR" smtClean="0"/>
+              <a:rPr lang="fr-FR" b="1" smtClean="0">
+                <a:solidFill>
+                  <a:schemeClr val="tx1"/>
+                </a:solidFill>
+              </a:rPr>
               <a:t>6</a:t>
             </a:fld>
-            <a:endParaRPr lang="fr-FR"/>
+            <a:endParaRPr lang="fr-FR" b="1" dirty="0">
+              <a:solidFill>
+                <a:schemeClr val="tx1"/>
+              </a:solidFill>
+            </a:endParaRPr>
           </a:p>
         </p:txBody>
       </p:sp>
@@ -13274,10 +13386,18 @@
           <a:lstStyle/>
           <a:p>
             <a:fld id="{43B0AB4A-0575-400B-9EA0-B9BBCBE45FA9}" type="slidenum">
-              <a:rPr lang="fr-FR" smtClean="0"/>
+              <a:rPr lang="fr-FR" b="1" smtClean="0">
+                <a:solidFill>
+                  <a:schemeClr val="tx1"/>
+                </a:solidFill>
+              </a:rPr>
               <a:t>7</a:t>
             </a:fld>
-            <a:endParaRPr lang="fr-FR"/>
+            <a:endParaRPr lang="fr-FR" b="1" dirty="0">
+              <a:solidFill>
+                <a:schemeClr val="tx1"/>
+              </a:solidFill>
+            </a:endParaRPr>
           </a:p>
         </p:txBody>
       </p:sp>
@@ -14364,10 +14484,18 @@
           <a:lstStyle/>
           <a:p>
             <a:fld id="{43B0AB4A-0575-400B-9EA0-B9BBCBE45FA9}" type="slidenum">
-              <a:rPr lang="fr-FR" smtClean="0"/>
+              <a:rPr lang="fr-FR" b="1" smtClean="0">
+                <a:solidFill>
+                  <a:schemeClr val="tx1"/>
+                </a:solidFill>
+              </a:rPr>
               <a:t>8</a:t>
             </a:fld>
-            <a:endParaRPr lang="fr-FR"/>
+            <a:endParaRPr lang="fr-FR" b="1" dirty="0">
+              <a:solidFill>
+                <a:schemeClr val="tx1"/>
+              </a:solidFill>
+            </a:endParaRPr>
           </a:p>
         </p:txBody>
       </p:sp>
@@ -14782,10 +14910,18 @@
           <a:lstStyle/>
           <a:p>
             <a:fld id="{43B0AB4A-0575-400B-9EA0-B9BBCBE45FA9}" type="slidenum">
-              <a:rPr lang="fr-FR" smtClean="0"/>
+              <a:rPr lang="fr-FR" b="1" smtClean="0">
+                <a:solidFill>
+                  <a:schemeClr val="tx1"/>
+                </a:solidFill>
+              </a:rPr>
               <a:t>9</a:t>
             </a:fld>
-            <a:endParaRPr lang="fr-FR"/>
+            <a:endParaRPr lang="fr-FR" b="1" dirty="0">
+              <a:solidFill>
+                <a:schemeClr val="tx1"/>
+              </a:solidFill>
+            </a:endParaRPr>
           </a:p>
         </p:txBody>
       </p:sp>

</xml_diff>